<commit_message>
menambahkan link github pada ppt
</commit_message>
<xml_diff>
--- a/Homework_ML_Preparation.pptx
+++ b/Homework_ML_Preparation.pptx
@@ -337,6 +337,11 @@
             <a:srgbClr val="747775"/>
           </p15:clr>
         </p15:guide>
+        <p15:guide id="2" pos="2880">
+          <p15:clr>
+            <a:srgbClr val="A4A3A4"/>
+          </p15:clr>
+        </p15:guide>
       </p15:sldGuideLst>
     </p:ext>
   </p:extLst>
@@ -1995,8 +2000,8 @@
         </p:nvSpPr>
         <p:spPr>
           <a:xfrm>
-            <a:off x="1143225" y="685778"/>
-            <a:ext cx="4572225" cy="3428978"/>
+            <a:off x="381000" y="685800"/>
+            <a:ext cx="6096000" cy="3429000"/>
           </a:xfrm>
           <a:custGeom>
             <a:avLst/>
@@ -19323,7 +19328,7 @@
         <p:spPr>
           <a:xfrm>
             <a:off x="653500" y="1217879"/>
-            <a:ext cx="7785600" cy="2648700"/>
+            <a:ext cx="7785600" cy="2351926"/>
           </a:xfrm>
           <a:prstGeom prst="rect">
             <a:avLst/>
@@ -19538,24 +19543,28 @@
               <a:t>Link github:</a:t>
             </a:r>
             <a:r>
-              <a:rPr lang="id" sz="1500" dirty="0">
-                <a:latin typeface="Verdana"/>
-                <a:ea typeface="Verdana"/>
-                <a:cs typeface="Verdana"/>
-                <a:sym typeface="Verdana"/>
+              <a:rPr lang="en-US" sz="1500" b="1" dirty="0">
+                <a:latin typeface="Tahoma"/>
+                <a:ea typeface="Tahoma"/>
+                <a:cs typeface="Tahoma"/>
+                <a:sym typeface="Tahoma"/>
               </a:rPr>
               <a:t> </a:t>
             </a:r>
             <a:r>
-              <a:rPr lang="id" sz="1500" b="1" dirty="0">
-                <a:latin typeface="Verdana"/>
-                <a:ea typeface="Verdana"/>
-                <a:cs typeface="Verdana"/>
-                <a:sym typeface="Verdana"/>
+              <a:rPr lang="en-US" sz="1500" dirty="0">
+                <a:latin typeface="Tahoma"/>
+                <a:ea typeface="Tahoma"/>
+                <a:cs typeface="Tahoma"/>
+                <a:sym typeface="Tahoma"/>
+                <a:hlinkClick r:id="rId5"/>
               </a:rPr>
-              <a:t>(masukkin link github masing masing)</a:t>
-            </a:r>
-            <a:endParaRPr sz="1500" b="1" dirty="0">
+              <a:t>https://github.com/yogajha218/Ida-Bagus-Yoga-ML-Preration-Bytesquad</a:t>
+            </a:r>
+            <a:endParaRPr sz="1500" u="sng" dirty="0">
+              <a:solidFill>
+                <a:srgbClr val="0563C1"/>
+              </a:solidFill>
               <a:latin typeface="Verdana"/>
               <a:ea typeface="Verdana"/>
               <a:cs typeface="Verdana"/>

</xml_diff>